<commit_message>
Updated Informe de Avance/2013-10-19-InformedeAvance.pptx y Reunion Formal.pptx
</commit_message>
<xml_diff>
--- a/docs/Reuniones/Sprint 3/Informe de Avance/2013-10-19-InformedeAvance.pptx
+++ b/docs/Reuniones/Sprint 3/Informe de Avance/2013-10-19-InformedeAvance.pptx
@@ -318,7 +318,7 @@
           <a:p>
             <a:fld id="{2E617C37-6303-42D8-BFE6-5EB24290275E}" type="datetimeFigureOut">
               <a:rPr lang="es-AR" smtClean="0"/>
-              <a:t>19/10/2013</a:t>
+              <a:t>21/10/2013</a:t>
             </a:fld>
             <a:endParaRPr lang="es-AR"/>
           </a:p>
@@ -508,7 +508,7 @@
           <a:p>
             <a:fld id="{2E617C37-6303-42D8-BFE6-5EB24290275E}" type="datetimeFigureOut">
               <a:rPr lang="es-AR" smtClean="0"/>
-              <a:t>19/10/2013</a:t>
+              <a:t>21/10/2013</a:t>
             </a:fld>
             <a:endParaRPr lang="es-AR"/>
           </a:p>
@@ -688,7 +688,7 @@
           <a:p>
             <a:fld id="{2E617C37-6303-42D8-BFE6-5EB24290275E}" type="datetimeFigureOut">
               <a:rPr lang="es-AR" smtClean="0"/>
-              <a:t>19/10/2013</a:t>
+              <a:t>21/10/2013</a:t>
             </a:fld>
             <a:endParaRPr lang="es-AR"/>
           </a:p>
@@ -858,7 +858,7 @@
           <a:p>
             <a:fld id="{2E617C37-6303-42D8-BFE6-5EB24290275E}" type="datetimeFigureOut">
               <a:rPr lang="es-AR" smtClean="0"/>
-              <a:t>19/10/2013</a:t>
+              <a:t>21/10/2013</a:t>
             </a:fld>
             <a:endParaRPr lang="es-AR"/>
           </a:p>
@@ -1114,7 +1114,7 @@
           <a:p>
             <a:fld id="{2E617C37-6303-42D8-BFE6-5EB24290275E}" type="datetimeFigureOut">
               <a:rPr lang="es-AR" smtClean="0"/>
-              <a:t>19/10/2013</a:t>
+              <a:t>21/10/2013</a:t>
             </a:fld>
             <a:endParaRPr lang="es-AR"/>
           </a:p>
@@ -1402,7 +1402,7 @@
           <a:p>
             <a:fld id="{2E617C37-6303-42D8-BFE6-5EB24290275E}" type="datetimeFigureOut">
               <a:rPr lang="es-AR" smtClean="0"/>
-              <a:t>19/10/2013</a:t>
+              <a:t>21/10/2013</a:t>
             </a:fld>
             <a:endParaRPr lang="es-AR"/>
           </a:p>
@@ -1840,7 +1840,7 @@
           <a:p>
             <a:fld id="{2E617C37-6303-42D8-BFE6-5EB24290275E}" type="datetimeFigureOut">
               <a:rPr lang="es-AR" smtClean="0"/>
-              <a:t>19/10/2013</a:t>
+              <a:t>21/10/2013</a:t>
             </a:fld>
             <a:endParaRPr lang="es-AR"/>
           </a:p>
@@ -1958,7 +1958,7 @@
           <a:p>
             <a:fld id="{2E617C37-6303-42D8-BFE6-5EB24290275E}" type="datetimeFigureOut">
               <a:rPr lang="es-AR" smtClean="0"/>
-              <a:t>19/10/2013</a:t>
+              <a:t>21/10/2013</a:t>
             </a:fld>
             <a:endParaRPr lang="es-AR"/>
           </a:p>
@@ -2053,7 +2053,7 @@
           <a:p>
             <a:fld id="{2E617C37-6303-42D8-BFE6-5EB24290275E}" type="datetimeFigureOut">
               <a:rPr lang="es-AR" smtClean="0"/>
-              <a:t>19/10/2013</a:t>
+              <a:t>21/10/2013</a:t>
             </a:fld>
             <a:endParaRPr lang="es-AR"/>
           </a:p>
@@ -2409,7 +2409,7 @@
           <a:p>
             <a:fld id="{2E617C37-6303-42D8-BFE6-5EB24290275E}" type="datetimeFigureOut">
               <a:rPr lang="es-AR" smtClean="0"/>
-              <a:t>19/10/2013</a:t>
+              <a:t>21/10/2013</a:t>
             </a:fld>
             <a:endParaRPr lang="es-AR"/>
           </a:p>
@@ -2725,7 +2725,7 @@
           <a:p>
             <a:fld id="{2E617C37-6303-42D8-BFE6-5EB24290275E}" type="datetimeFigureOut">
               <a:rPr lang="es-AR" smtClean="0"/>
-              <a:t>19/10/2013</a:t>
+              <a:t>21/10/2013</a:t>
             </a:fld>
             <a:endParaRPr lang="es-AR"/>
           </a:p>
@@ -2958,7 +2958,7 @@
           <a:p>
             <a:fld id="{2E617C37-6303-42D8-BFE6-5EB24290275E}" type="datetimeFigureOut">
               <a:rPr lang="es-AR" smtClean="0"/>
-              <a:t>19/10/2013</a:t>
+              <a:t>21/10/2013</a:t>
             </a:fld>
             <a:endParaRPr lang="es-AR"/>
           </a:p>
@@ -3906,11 +3906,11 @@
               <a:buChar char="ü"/>
             </a:pPr>
             <a:r>
-              <a:rPr lang="es-AR" sz="3200" dirty="0"/>
+              <a:rPr lang="es-AR" sz="3200" dirty="0" smtClean="0"/>
               <a:t>Permitir usuarios </a:t>
             </a:r>
             <a:r>
-              <a:rPr lang="es-AR" sz="3200" dirty="0" err="1"/>
+              <a:rPr lang="es-AR" sz="3200" dirty="0" err="1" smtClean="0"/>
               <a:t>read-only</a:t>
             </a:r>
             <a:endParaRPr lang="es-AR" sz="3200" dirty="0"/>

</xml_diff>